<commit_message>
Added an instruction for JDBC driver installation
</commit_message>
<xml_diff>
--- a/javadb/resources/Installing PostgreSQL.pptx
+++ b/javadb/resources/Installing PostgreSQL.pptx
@@ -14,6 +14,9 @@
     <p:sldId id="263" r:id="rId8"/>
     <p:sldId id="264" r:id="rId9"/>
     <p:sldId id="265" r:id="rId10"/>
+    <p:sldId id="266" r:id="rId11"/>
+    <p:sldId id="268" r:id="rId12"/>
+    <p:sldId id="269" r:id="rId13"/>
   </p:sldIdLst>
   <p:sldSz cx="12192000" cy="6858000"/>
   <p:notesSz cx="6858000" cy="9144000"/>
@@ -3419,6 +3422,933 @@
     <p:extLst>
       <p:ext uri="{BB962C8B-B14F-4D97-AF65-F5344CB8AC3E}">
         <p14:creationId xmlns:p14="http://schemas.microsoft.com/office/powerpoint/2010/main" val="3313346456"/>
+      </p:ext>
+    </p:extLst>
+  </p:cSld>
+  <p:clrMapOvr>
+    <a:masterClrMapping/>
+  </p:clrMapOvr>
+</p:sld>
+</file>
+
+<file path=ppt/slides/slide10.xml><?xml version="1.0" encoding="utf-8"?>
+<p:sld xmlns:a="http://schemas.openxmlformats.org/drawingml/2006/main" xmlns:r="http://schemas.openxmlformats.org/officeDocument/2006/relationships" xmlns:p="http://schemas.openxmlformats.org/presentationml/2006/main">
+  <p:cSld>
+    <p:spTree>
+      <p:nvGrpSpPr>
+        <p:cNvPr id="1" name=""/>
+        <p:cNvGrpSpPr/>
+        <p:nvPr/>
+      </p:nvGrpSpPr>
+      <p:grpSpPr>
+        <a:xfrm>
+          <a:off x="0" y="0"/>
+          <a:ext cx="0" cy="0"/>
+          <a:chOff x="0" y="0"/>
+          <a:chExt cx="0" cy="0"/>
+        </a:xfrm>
+      </p:grpSpPr>
+      <p:sp>
+        <p:nvSpPr>
+          <p:cNvPr id="2" name="Title 1">
+            <a:extLst>
+              <a:ext uri="{FF2B5EF4-FFF2-40B4-BE49-F238E27FC236}">
+                <a16:creationId xmlns:a16="http://schemas.microsoft.com/office/drawing/2014/main" id="{23BDFC03-D2FB-4436-9867-41B0D1956A65}"/>
+              </a:ext>
+            </a:extLst>
+          </p:cNvPr>
+          <p:cNvSpPr>
+            <a:spLocks noGrp="1"/>
+          </p:cNvSpPr>
+          <p:nvPr>
+            <p:ph type="title"/>
+          </p:nvPr>
+        </p:nvSpPr>
+        <p:spPr/>
+        <p:txBody>
+          <a:bodyPr/>
+          <a:lstStyle/>
+          <a:p>
+            <a:r>
+              <a:rPr lang="lv-LV" dirty="0"/>
+              <a:t>5. Install JDBC driver and add it to </a:t>
+            </a:r>
+            <a:r>
+              <a:rPr lang="lv-LV" sz="3600" dirty="0">
+                <a:latin typeface="Lucida Console" panose="020B0609040504020204" pitchFamily="49" charset="0"/>
+              </a:rPr>
+              <a:t>CLASSPATH</a:t>
+            </a:r>
+            <a:endParaRPr lang="en-US" dirty="0"/>
+          </a:p>
+        </p:txBody>
+      </p:sp>
+      <p:sp>
+        <p:nvSpPr>
+          <p:cNvPr id="3" name="Content Placeholder 2">
+            <a:extLst>
+              <a:ext uri="{FF2B5EF4-FFF2-40B4-BE49-F238E27FC236}">
+                <a16:creationId xmlns:a16="http://schemas.microsoft.com/office/drawing/2014/main" id="{6CC4AE50-6A2B-432F-8AB0-995157F8132D}"/>
+              </a:ext>
+            </a:extLst>
+          </p:cNvPr>
+          <p:cNvSpPr>
+            <a:spLocks noGrp="1"/>
+          </p:cNvSpPr>
+          <p:nvPr>
+            <p:ph idx="1"/>
+          </p:nvPr>
+        </p:nvSpPr>
+        <p:spPr/>
+        <p:txBody>
+          <a:bodyPr/>
+          <a:lstStyle/>
+          <a:p>
+            <a:pPr marL="0" indent="0">
+              <a:buNone/>
+            </a:pPr>
+            <a:r>
+              <a:rPr lang="lv-LV" dirty="0"/>
+              <a:t>Go to the page to download a JAR:</a:t>
+            </a:r>
+          </a:p>
+          <a:p>
+            <a:pPr marL="0" indent="0">
+              <a:buNone/>
+            </a:pPr>
+            <a:r>
+              <a:rPr lang="en-US" u="sng" dirty="0">
+                <a:hlinkClick r:id="rId2"/>
+              </a:rPr>
+              <a:t>https://jdbc.postgresql.org/download/postgresql-42.1.4.jar</a:t>
+            </a:r>
+            <a:endParaRPr lang="lv-LV" u="sng" dirty="0"/>
+          </a:p>
+          <a:p>
+            <a:pPr marL="0" indent="0">
+              <a:buNone/>
+            </a:pPr>
+            <a:endParaRPr lang="lv-LV" u="sng" dirty="0"/>
+          </a:p>
+          <a:p>
+            <a:pPr marL="0" indent="0">
+              <a:buNone/>
+            </a:pPr>
+            <a:r>
+              <a:rPr lang="lv-LV" dirty="0"/>
+              <a:t>Y</a:t>
+            </a:r>
+            <a:r>
+              <a:rPr lang="en-US" dirty="0" err="1"/>
+              <a:t>ou</a:t>
+            </a:r>
+            <a:r>
+              <a:rPr lang="en-US" dirty="0"/>
+              <a:t> can install the driver by placing </a:t>
+            </a:r>
+            <a:r>
+              <a:rPr lang="en-US" b="1" i="1" dirty="0"/>
+              <a:t>postgresql-42.1.4.jar </a:t>
+            </a:r>
+            <a:r>
+              <a:rPr lang="en-US" dirty="0"/>
+              <a:t>in your </a:t>
+            </a:r>
+            <a:r>
+              <a:rPr lang="en-US" dirty="0" err="1"/>
+              <a:t>classpath</a:t>
+            </a:r>
+            <a:r>
+              <a:rPr lang="lv-LV" dirty="0"/>
+              <a:t> </a:t>
+            </a:r>
+            <a:r>
+              <a:rPr lang="en-US" dirty="0"/>
+              <a:t>through the System Control Panel</a:t>
+            </a:r>
+            <a:r>
+              <a:rPr lang="lv-LV" dirty="0"/>
+              <a:t>.</a:t>
+            </a:r>
+            <a:endParaRPr lang="en-US" dirty="0"/>
+          </a:p>
+          <a:p>
+            <a:pPr marL="0" indent="0">
+              <a:buNone/>
+            </a:pPr>
+            <a:endParaRPr lang="lv-LV" dirty="0"/>
+          </a:p>
+        </p:txBody>
+      </p:sp>
+    </p:spTree>
+    <p:extLst>
+      <p:ext uri="{BB962C8B-B14F-4D97-AF65-F5344CB8AC3E}">
+        <p14:creationId xmlns:p14="http://schemas.microsoft.com/office/powerpoint/2010/main" val="3952219115"/>
+      </p:ext>
+    </p:extLst>
+  </p:cSld>
+  <p:clrMapOvr>
+    <a:masterClrMapping/>
+  </p:clrMapOvr>
+</p:sld>
+</file>
+
+<file path=ppt/slides/slide11.xml><?xml version="1.0" encoding="utf-8"?>
+<p:sld xmlns:a="http://schemas.openxmlformats.org/drawingml/2006/main" xmlns:r="http://schemas.openxmlformats.org/officeDocument/2006/relationships" xmlns:p="http://schemas.openxmlformats.org/presentationml/2006/main">
+  <p:cSld>
+    <p:spTree>
+      <p:nvGrpSpPr>
+        <p:cNvPr id="1" name=""/>
+        <p:cNvGrpSpPr/>
+        <p:nvPr/>
+      </p:nvGrpSpPr>
+      <p:grpSpPr>
+        <a:xfrm>
+          <a:off x="0" y="0"/>
+          <a:ext cx="0" cy="0"/>
+          <a:chOff x="0" y="0"/>
+          <a:chExt cx="0" cy="0"/>
+        </a:xfrm>
+      </p:grpSpPr>
+      <p:sp>
+        <p:nvSpPr>
+          <p:cNvPr id="2" name="Title 1">
+            <a:extLst>
+              <a:ext uri="{FF2B5EF4-FFF2-40B4-BE49-F238E27FC236}">
+                <a16:creationId xmlns:a16="http://schemas.microsoft.com/office/drawing/2014/main" id="{2CDC8A67-6CCA-4C7F-BCE4-64D301C77D4F}"/>
+              </a:ext>
+            </a:extLst>
+          </p:cNvPr>
+          <p:cNvSpPr>
+            <a:spLocks noGrp="1"/>
+          </p:cNvSpPr>
+          <p:nvPr>
+            <p:ph type="title"/>
+          </p:nvPr>
+        </p:nvSpPr>
+        <p:spPr/>
+        <p:txBody>
+          <a:bodyPr/>
+          <a:lstStyle/>
+          <a:p>
+            <a:r>
+              <a:rPr lang="lv-LV" dirty="0"/>
+              <a:t>5.1. Locate Environmental Variables</a:t>
+            </a:r>
+            <a:endParaRPr lang="en-US" dirty="0"/>
+          </a:p>
+        </p:txBody>
+      </p:sp>
+      <p:sp>
+        <p:nvSpPr>
+          <p:cNvPr id="3" name="Content Placeholder 2">
+            <a:extLst>
+              <a:ext uri="{FF2B5EF4-FFF2-40B4-BE49-F238E27FC236}">
+                <a16:creationId xmlns:a16="http://schemas.microsoft.com/office/drawing/2014/main" id="{B2C01BD3-0783-4ED7-85FE-4AADB2920F36}"/>
+              </a:ext>
+            </a:extLst>
+          </p:cNvPr>
+          <p:cNvSpPr>
+            <a:spLocks noGrp="1"/>
+          </p:cNvSpPr>
+          <p:nvPr>
+            <p:ph idx="1"/>
+          </p:nvPr>
+        </p:nvSpPr>
+        <p:spPr/>
+        <p:txBody>
+          <a:bodyPr>
+            <a:normAutofit/>
+          </a:bodyPr>
+          <a:lstStyle/>
+          <a:p>
+            <a:pPr marL="0" indent="0">
+              <a:buNone/>
+            </a:pPr>
+            <a:r>
+              <a:rPr lang="lv-LV" sz="2400" dirty="0"/>
+              <a:t>To add a driver to your </a:t>
+            </a:r>
+            <a:r>
+              <a:rPr lang="lv-LV" sz="2400" dirty="0">
+                <a:latin typeface="Lucida Console" panose="020B0609040504020204" pitchFamily="49" charset="0"/>
+              </a:rPr>
+              <a:t>CLASSPATH</a:t>
+            </a:r>
+            <a:r>
+              <a:rPr lang="lv-LV" sz="2400" dirty="0"/>
+              <a:t>, open File Explorer, click on </a:t>
+            </a:r>
+            <a:r>
+              <a:rPr lang="lv-LV" sz="2400" b="1" i="1" dirty="0"/>
+              <a:t>This PC </a:t>
+            </a:r>
+            <a:r>
+              <a:rPr lang="lv-LV" sz="2400" dirty="0"/>
+              <a:t>and choose </a:t>
+            </a:r>
+            <a:r>
+              <a:rPr lang="lv-LV" sz="2400" b="1" i="1" dirty="0"/>
+              <a:t>Properties</a:t>
+            </a:r>
+            <a:r>
+              <a:rPr lang="lv-LV" sz="2400" dirty="0"/>
+              <a:t>. In the </a:t>
+            </a:r>
+            <a:r>
+              <a:rPr lang="lv-LV" sz="2400" i="1" dirty="0"/>
+              <a:t>System</a:t>
+            </a:r>
+            <a:r>
+              <a:rPr lang="lv-LV" sz="2400" dirty="0"/>
+              <a:t> window choose </a:t>
+            </a:r>
+            <a:r>
+              <a:rPr lang="lv-LV" sz="2400" b="1" i="1" dirty="0"/>
+              <a:t>Advanced system settings</a:t>
+            </a:r>
+            <a:r>
+              <a:rPr lang="lv-LV" sz="2400" dirty="0"/>
+              <a:t>. In the </a:t>
+            </a:r>
+            <a:r>
+              <a:rPr lang="lv-LV" sz="2400" i="1" dirty="0"/>
+              <a:t>System Properties</a:t>
+            </a:r>
+            <a:r>
+              <a:rPr lang="lv-LV" sz="2400" dirty="0"/>
+              <a:t> window click on </a:t>
+            </a:r>
+            <a:r>
+              <a:rPr lang="lv-LV" sz="2400" b="1" i="1" dirty="0"/>
+              <a:t>Environment Variables</a:t>
+            </a:r>
+            <a:r>
+              <a:rPr lang="lv-LV" sz="2400" dirty="0"/>
+              <a:t>.</a:t>
+            </a:r>
+          </a:p>
+        </p:txBody>
+      </p:sp>
+      <p:pic>
+        <p:nvPicPr>
+          <p:cNvPr id="4" name="Picture 3">
+            <a:extLst>
+              <a:ext uri="{FF2B5EF4-FFF2-40B4-BE49-F238E27FC236}">
+                <a16:creationId xmlns:a16="http://schemas.microsoft.com/office/drawing/2014/main" id="{2A449C99-AA29-4F0A-8D6A-E59EFF087F0F}"/>
+              </a:ext>
+            </a:extLst>
+          </p:cNvPr>
+          <p:cNvPicPr>
+            <a:picLocks noChangeAspect="1"/>
+          </p:cNvPicPr>
+          <p:nvPr/>
+        </p:nvPicPr>
+        <p:blipFill rotWithShape="1">
+          <a:blip r:embed="rId2"/>
+          <a:srcRect l="3140"/>
+          <a:stretch/>
+        </p:blipFill>
+        <p:spPr>
+          <a:xfrm>
+            <a:off x="893049" y="3682670"/>
+            <a:ext cx="2472547" cy="2943225"/>
+          </a:xfrm>
+          <a:prstGeom prst="rect">
+            <a:avLst/>
+          </a:prstGeom>
+        </p:spPr>
+      </p:pic>
+      <p:sp>
+        <p:nvSpPr>
+          <p:cNvPr id="5" name="Oval 4">
+            <a:extLst>
+              <a:ext uri="{FF2B5EF4-FFF2-40B4-BE49-F238E27FC236}">
+                <a16:creationId xmlns:a16="http://schemas.microsoft.com/office/drawing/2014/main" id="{90FB1395-AF3B-48B5-8562-AD35EEBB516D}"/>
+              </a:ext>
+            </a:extLst>
+          </p:cNvPr>
+          <p:cNvSpPr/>
+          <p:nvPr/>
+        </p:nvSpPr>
+        <p:spPr>
+          <a:xfrm>
+            <a:off x="1052458" y="6291154"/>
+            <a:ext cx="862606" cy="247669"/>
+          </a:xfrm>
+          <a:prstGeom prst="ellipse">
+            <a:avLst/>
+          </a:prstGeom>
+          <a:noFill/>
+          <a:ln w="28575">
+            <a:solidFill>
+              <a:srgbClr val="FF0000"/>
+            </a:solidFill>
+          </a:ln>
+        </p:spPr>
+        <p:style>
+          <a:lnRef idx="2">
+            <a:schemeClr val="accent1">
+              <a:shade val="50000"/>
+            </a:schemeClr>
+          </a:lnRef>
+          <a:fillRef idx="1">
+            <a:schemeClr val="accent1"/>
+          </a:fillRef>
+          <a:effectRef idx="0">
+            <a:schemeClr val="accent1"/>
+          </a:effectRef>
+          <a:fontRef idx="minor">
+            <a:schemeClr val="lt1"/>
+          </a:fontRef>
+        </p:style>
+        <p:txBody>
+          <a:bodyPr rtlCol="0" anchor="ctr"/>
+          <a:lstStyle/>
+          <a:p>
+            <a:pPr algn="ctr"/>
+            <a:endParaRPr lang="en-US"/>
+          </a:p>
+        </p:txBody>
+      </p:sp>
+      <p:pic>
+        <p:nvPicPr>
+          <p:cNvPr id="6" name="Picture 5">
+            <a:extLst>
+              <a:ext uri="{FF2B5EF4-FFF2-40B4-BE49-F238E27FC236}">
+                <a16:creationId xmlns:a16="http://schemas.microsoft.com/office/drawing/2014/main" id="{3ADFBFCB-3098-400A-B99B-233E744536A4}"/>
+              </a:ext>
+            </a:extLst>
+          </p:cNvPr>
+          <p:cNvPicPr>
+            <a:picLocks noChangeAspect="1"/>
+          </p:cNvPicPr>
+          <p:nvPr/>
+        </p:nvPicPr>
+        <p:blipFill>
+          <a:blip r:embed="rId3"/>
+          <a:stretch>
+            <a:fillRect/>
+          </a:stretch>
+        </p:blipFill>
+        <p:spPr>
+          <a:xfrm>
+            <a:off x="4066610" y="3572504"/>
+            <a:ext cx="3448050" cy="2828925"/>
+          </a:xfrm>
+          <a:prstGeom prst="rect">
+            <a:avLst/>
+          </a:prstGeom>
+        </p:spPr>
+      </p:pic>
+      <p:sp>
+        <p:nvSpPr>
+          <p:cNvPr id="7" name="Oval 6">
+            <a:extLst>
+              <a:ext uri="{FF2B5EF4-FFF2-40B4-BE49-F238E27FC236}">
+                <a16:creationId xmlns:a16="http://schemas.microsoft.com/office/drawing/2014/main" id="{492074C5-1BAB-4BE8-8688-15E4BB1A3537}"/>
+              </a:ext>
+            </a:extLst>
+          </p:cNvPr>
+          <p:cNvSpPr/>
+          <p:nvPr/>
+        </p:nvSpPr>
+        <p:spPr>
+          <a:xfrm>
+            <a:off x="4264931" y="5349705"/>
+            <a:ext cx="1525704" cy="393786"/>
+          </a:xfrm>
+          <a:prstGeom prst="ellipse">
+            <a:avLst/>
+          </a:prstGeom>
+          <a:noFill/>
+          <a:ln w="28575">
+            <a:solidFill>
+              <a:srgbClr val="FF0000"/>
+            </a:solidFill>
+          </a:ln>
+        </p:spPr>
+        <p:style>
+          <a:lnRef idx="2">
+            <a:schemeClr val="accent1">
+              <a:shade val="50000"/>
+            </a:schemeClr>
+          </a:lnRef>
+          <a:fillRef idx="1">
+            <a:schemeClr val="accent1"/>
+          </a:fillRef>
+          <a:effectRef idx="0">
+            <a:schemeClr val="accent1"/>
+          </a:effectRef>
+          <a:fontRef idx="minor">
+            <a:schemeClr val="lt1"/>
+          </a:fontRef>
+        </p:style>
+        <p:txBody>
+          <a:bodyPr rtlCol="0" anchor="ctr"/>
+          <a:lstStyle/>
+          <a:p>
+            <a:pPr algn="ctr"/>
+            <a:endParaRPr lang="en-US"/>
+          </a:p>
+        </p:txBody>
+      </p:sp>
+      <p:pic>
+        <p:nvPicPr>
+          <p:cNvPr id="8" name="Picture 7">
+            <a:extLst>
+              <a:ext uri="{FF2B5EF4-FFF2-40B4-BE49-F238E27FC236}">
+                <a16:creationId xmlns:a16="http://schemas.microsoft.com/office/drawing/2014/main" id="{83EDABCF-3AE0-4EBE-AC06-98FD782CD331}"/>
+              </a:ext>
+            </a:extLst>
+          </p:cNvPr>
+          <p:cNvPicPr>
+            <a:picLocks noChangeAspect="1"/>
+          </p:cNvPicPr>
+          <p:nvPr/>
+        </p:nvPicPr>
+        <p:blipFill>
+          <a:blip r:embed="rId4"/>
+          <a:stretch>
+            <a:fillRect/>
+          </a:stretch>
+        </p:blipFill>
+        <p:spPr>
+          <a:xfrm>
+            <a:off x="8238226" y="2777093"/>
+            <a:ext cx="3440358" cy="3848802"/>
+          </a:xfrm>
+          <a:prstGeom prst="rect">
+            <a:avLst/>
+          </a:prstGeom>
+        </p:spPr>
+      </p:pic>
+      <p:sp>
+        <p:nvSpPr>
+          <p:cNvPr id="9" name="Oval 8">
+            <a:extLst>
+              <a:ext uri="{FF2B5EF4-FFF2-40B4-BE49-F238E27FC236}">
+                <a16:creationId xmlns:a16="http://schemas.microsoft.com/office/drawing/2014/main" id="{1B3CDB82-DEB6-453B-ABA7-21DA0970E88D}"/>
+              </a:ext>
+            </a:extLst>
+          </p:cNvPr>
+          <p:cNvSpPr/>
+          <p:nvPr/>
+        </p:nvSpPr>
+        <p:spPr>
+          <a:xfrm>
+            <a:off x="10270644" y="5793545"/>
+            <a:ext cx="1083156" cy="293676"/>
+          </a:xfrm>
+          <a:prstGeom prst="ellipse">
+            <a:avLst/>
+          </a:prstGeom>
+          <a:noFill/>
+          <a:ln w="28575">
+            <a:solidFill>
+              <a:srgbClr val="FF0000"/>
+            </a:solidFill>
+          </a:ln>
+        </p:spPr>
+        <p:style>
+          <a:lnRef idx="2">
+            <a:schemeClr val="accent1">
+              <a:shade val="50000"/>
+            </a:schemeClr>
+          </a:lnRef>
+          <a:fillRef idx="1">
+            <a:schemeClr val="accent1"/>
+          </a:fillRef>
+          <a:effectRef idx="0">
+            <a:schemeClr val="accent1"/>
+          </a:effectRef>
+          <a:fontRef idx="minor">
+            <a:schemeClr val="lt1"/>
+          </a:fontRef>
+        </p:style>
+        <p:txBody>
+          <a:bodyPr rtlCol="0" anchor="ctr"/>
+          <a:lstStyle/>
+          <a:p>
+            <a:pPr algn="ctr"/>
+            <a:endParaRPr lang="en-US"/>
+          </a:p>
+        </p:txBody>
+      </p:sp>
+      <p:pic>
+        <p:nvPicPr>
+          <p:cNvPr id="11" name="Graphic 10" descr="Line Arrow: Straight">
+            <a:extLst>
+              <a:ext uri="{FF2B5EF4-FFF2-40B4-BE49-F238E27FC236}">
+                <a16:creationId xmlns:a16="http://schemas.microsoft.com/office/drawing/2014/main" id="{598A6D69-8B89-4D83-8739-19DAB3CF65EC}"/>
+              </a:ext>
+            </a:extLst>
+          </p:cNvPr>
+          <p:cNvPicPr>
+            <a:picLocks noChangeAspect="1"/>
+          </p:cNvPicPr>
+          <p:nvPr/>
+        </p:nvPicPr>
+        <p:blipFill>
+          <a:blip r:embed="rId5">
+            <a:extLst>
+              <a:ext uri="{28A0092B-C50C-407E-A947-70E740481C1C}">
+                <a14:useLocalDpi xmlns:a14="http://schemas.microsoft.com/office/drawing/2010/main" val="0"/>
+              </a:ext>
+              <a:ext uri="{96DAC541-7B7A-43D3-8B79-37D633B846F1}">
+                <asvg:svgBlip xmlns:asvg="http://schemas.microsoft.com/office/drawing/2016/SVG/main" r:embed="rId6"/>
+              </a:ext>
+            </a:extLst>
+          </a:blip>
+          <a:stretch>
+            <a:fillRect/>
+          </a:stretch>
+        </p:blipFill>
+        <p:spPr>
+          <a:xfrm rot="10800000">
+            <a:off x="3375512" y="4925873"/>
+            <a:ext cx="620724" cy="620724"/>
+          </a:xfrm>
+          <a:prstGeom prst="rect">
+            <a:avLst/>
+          </a:prstGeom>
+        </p:spPr>
+      </p:pic>
+      <p:pic>
+        <p:nvPicPr>
+          <p:cNvPr id="12" name="Graphic 11" descr="Line Arrow: Straight">
+            <a:extLst>
+              <a:ext uri="{FF2B5EF4-FFF2-40B4-BE49-F238E27FC236}">
+                <a16:creationId xmlns:a16="http://schemas.microsoft.com/office/drawing/2014/main" id="{90F80D61-9A06-4A46-B191-5E41868252F9}"/>
+              </a:ext>
+            </a:extLst>
+          </p:cNvPr>
+          <p:cNvPicPr>
+            <a:picLocks noChangeAspect="1"/>
+          </p:cNvPicPr>
+          <p:nvPr/>
+        </p:nvPicPr>
+        <p:blipFill>
+          <a:blip r:embed="rId5">
+            <a:extLst>
+              <a:ext uri="{28A0092B-C50C-407E-A947-70E740481C1C}">
+                <a14:useLocalDpi xmlns:a14="http://schemas.microsoft.com/office/drawing/2010/main" val="0"/>
+              </a:ext>
+              <a:ext uri="{96DAC541-7B7A-43D3-8B79-37D633B846F1}">
+                <asvg:svgBlip xmlns:asvg="http://schemas.microsoft.com/office/drawing/2016/SVG/main" r:embed="rId6"/>
+              </a:ext>
+            </a:extLst>
+          </a:blip>
+          <a:stretch>
+            <a:fillRect/>
+          </a:stretch>
+        </p:blipFill>
+        <p:spPr>
+          <a:xfrm rot="10800000">
+            <a:off x="7585034" y="4843920"/>
+            <a:ext cx="620724" cy="620724"/>
+          </a:xfrm>
+          <a:prstGeom prst="rect">
+            <a:avLst/>
+          </a:prstGeom>
+        </p:spPr>
+      </p:pic>
+    </p:spTree>
+    <p:extLst>
+      <p:ext uri="{BB962C8B-B14F-4D97-AF65-F5344CB8AC3E}">
+        <p14:creationId xmlns:p14="http://schemas.microsoft.com/office/powerpoint/2010/main" val="3883078980"/>
+      </p:ext>
+    </p:extLst>
+  </p:cSld>
+  <p:clrMapOvr>
+    <a:masterClrMapping/>
+  </p:clrMapOvr>
+</p:sld>
+</file>
+
+<file path=ppt/slides/slide12.xml><?xml version="1.0" encoding="utf-8"?>
+<p:sld xmlns:a="http://schemas.openxmlformats.org/drawingml/2006/main" xmlns:r="http://schemas.openxmlformats.org/officeDocument/2006/relationships" xmlns:p="http://schemas.openxmlformats.org/presentationml/2006/main">
+  <p:cSld>
+    <p:spTree>
+      <p:nvGrpSpPr>
+        <p:cNvPr id="1" name=""/>
+        <p:cNvGrpSpPr/>
+        <p:nvPr/>
+      </p:nvGrpSpPr>
+      <p:grpSpPr>
+        <a:xfrm>
+          <a:off x="0" y="0"/>
+          <a:ext cx="0" cy="0"/>
+          <a:chOff x="0" y="0"/>
+          <a:chExt cx="0" cy="0"/>
+        </a:xfrm>
+      </p:grpSpPr>
+      <p:pic>
+        <p:nvPicPr>
+          <p:cNvPr id="7" name="Picture 6">
+            <a:extLst>
+              <a:ext uri="{FF2B5EF4-FFF2-40B4-BE49-F238E27FC236}">
+                <a16:creationId xmlns:a16="http://schemas.microsoft.com/office/drawing/2014/main" id="{1A723DF6-CED3-4CEA-A6D7-2BE84CEF65A9}"/>
+              </a:ext>
+            </a:extLst>
+          </p:cNvPr>
+          <p:cNvPicPr>
+            <a:picLocks noChangeAspect="1"/>
+          </p:cNvPicPr>
+          <p:nvPr/>
+        </p:nvPicPr>
+        <p:blipFill>
+          <a:blip r:embed="rId2"/>
+          <a:stretch>
+            <a:fillRect/>
+          </a:stretch>
+        </p:blipFill>
+        <p:spPr>
+          <a:xfrm>
+            <a:off x="4847850" y="4171490"/>
+            <a:ext cx="6400800" cy="1762125"/>
+          </a:xfrm>
+          <a:prstGeom prst="rect">
+            <a:avLst/>
+          </a:prstGeom>
+        </p:spPr>
+      </p:pic>
+      <p:pic>
+        <p:nvPicPr>
+          <p:cNvPr id="5" name="Picture 4">
+            <a:extLst>
+              <a:ext uri="{FF2B5EF4-FFF2-40B4-BE49-F238E27FC236}">
+                <a16:creationId xmlns:a16="http://schemas.microsoft.com/office/drawing/2014/main" id="{7FE801AF-878F-486D-95DA-F34F6B73CCB3}"/>
+              </a:ext>
+            </a:extLst>
+          </p:cNvPr>
+          <p:cNvPicPr>
+            <a:picLocks noChangeAspect="1"/>
+          </p:cNvPicPr>
+          <p:nvPr/>
+        </p:nvPicPr>
+        <p:blipFill>
+          <a:blip r:embed="rId3"/>
+          <a:stretch>
+            <a:fillRect/>
+          </a:stretch>
+        </p:blipFill>
+        <p:spPr>
+          <a:xfrm>
+            <a:off x="957506" y="3314034"/>
+            <a:ext cx="3663310" cy="3477038"/>
+          </a:xfrm>
+          <a:prstGeom prst="rect">
+            <a:avLst/>
+          </a:prstGeom>
+        </p:spPr>
+      </p:pic>
+      <p:sp>
+        <p:nvSpPr>
+          <p:cNvPr id="2" name="Title 1">
+            <a:extLst>
+              <a:ext uri="{FF2B5EF4-FFF2-40B4-BE49-F238E27FC236}">
+                <a16:creationId xmlns:a16="http://schemas.microsoft.com/office/drawing/2014/main" id="{BF71172B-97C6-42A9-86E2-74872A61EBA7}"/>
+              </a:ext>
+            </a:extLst>
+          </p:cNvPr>
+          <p:cNvSpPr>
+            <a:spLocks noGrp="1"/>
+          </p:cNvSpPr>
+          <p:nvPr>
+            <p:ph type="title"/>
+          </p:nvPr>
+        </p:nvSpPr>
+        <p:spPr/>
+        <p:txBody>
+          <a:bodyPr/>
+          <a:lstStyle/>
+          <a:p>
+            <a:r>
+              <a:rPr lang="lv-LV" dirty="0"/>
+              <a:t>5.2. Edit variable </a:t>
+            </a:r>
+            <a:r>
+              <a:rPr lang="lv-LV" dirty="0">
+                <a:latin typeface="Lucida Console" panose="020B0609040504020204" pitchFamily="49" charset="0"/>
+              </a:rPr>
+              <a:t>CLASSPATH</a:t>
+            </a:r>
+            <a:endParaRPr lang="en-US" dirty="0"/>
+          </a:p>
+        </p:txBody>
+      </p:sp>
+      <p:sp>
+        <p:nvSpPr>
+          <p:cNvPr id="3" name="Content Placeholder 2">
+            <a:extLst>
+              <a:ext uri="{FF2B5EF4-FFF2-40B4-BE49-F238E27FC236}">
+                <a16:creationId xmlns:a16="http://schemas.microsoft.com/office/drawing/2014/main" id="{FD11003F-87AB-45AA-80E6-0D27DB990E92}"/>
+              </a:ext>
+            </a:extLst>
+          </p:cNvPr>
+          <p:cNvSpPr>
+            <a:spLocks noGrp="1"/>
+          </p:cNvSpPr>
+          <p:nvPr>
+            <p:ph idx="1"/>
+          </p:nvPr>
+        </p:nvSpPr>
+        <p:spPr>
+          <a:xfrm>
+            <a:off x="838200" y="1825625"/>
+            <a:ext cx="10919604" cy="4351338"/>
+          </a:xfrm>
+        </p:spPr>
+        <p:txBody>
+          <a:bodyPr/>
+          <a:lstStyle/>
+          <a:p>
+            <a:pPr marL="0" indent="0">
+              <a:buNone/>
+            </a:pPr>
+            <a:r>
+              <a:rPr lang="lv-LV" dirty="0"/>
+              <a:t>In </a:t>
+            </a:r>
+            <a:r>
+              <a:rPr lang="lv-LV" i="1" dirty="0"/>
+              <a:t>User variables</a:t>
+            </a:r>
+            <a:r>
+              <a:rPr lang="lv-LV" dirty="0"/>
+              <a:t> you should already have a </a:t>
+            </a:r>
+            <a:r>
+              <a:rPr lang="lv-LV" sz="2400" dirty="0">
+                <a:solidFill>
+                  <a:prstClr val="black"/>
+                </a:solidFill>
+                <a:latin typeface="Lucida Console" panose="020B0609040504020204" pitchFamily="49" charset="0"/>
+                <a:ea typeface="+mj-ea"/>
+                <a:cs typeface="+mj-cs"/>
+              </a:rPr>
+              <a:t>CLASSPATH</a:t>
+            </a:r>
+            <a:r>
+              <a:rPr lang="lv-LV" dirty="0"/>
+              <a:t> variable. Click on </a:t>
+            </a:r>
+            <a:r>
+              <a:rPr lang="lv-LV" i="1" dirty="0"/>
+              <a:t>Edit </a:t>
+            </a:r>
+            <a:r>
+              <a:rPr lang="lv-LV" dirty="0"/>
+              <a:t>and add a path to JAR after semicolon. After that close all opened windows by clicking </a:t>
+            </a:r>
+            <a:r>
+              <a:rPr lang="lv-LV" i="1" dirty="0"/>
+              <a:t>OK</a:t>
+            </a:r>
+            <a:r>
+              <a:rPr lang="lv-LV" dirty="0"/>
+              <a:t>.</a:t>
+            </a:r>
+            <a:endParaRPr lang="en-US" sz="2000" dirty="0"/>
+          </a:p>
+        </p:txBody>
+      </p:sp>
+      <p:sp>
+        <p:nvSpPr>
+          <p:cNvPr id="6" name="Oval 5">
+            <a:extLst>
+              <a:ext uri="{FF2B5EF4-FFF2-40B4-BE49-F238E27FC236}">
+                <a16:creationId xmlns:a16="http://schemas.microsoft.com/office/drawing/2014/main" id="{674224A1-8438-4864-9BA3-373A838249B2}"/>
+              </a:ext>
+            </a:extLst>
+          </p:cNvPr>
+          <p:cNvSpPr/>
+          <p:nvPr/>
+        </p:nvSpPr>
+        <p:spPr>
+          <a:xfrm>
+            <a:off x="3311668" y="4765834"/>
+            <a:ext cx="591741" cy="191829"/>
+          </a:xfrm>
+          <a:prstGeom prst="ellipse">
+            <a:avLst/>
+          </a:prstGeom>
+          <a:noFill/>
+          <a:ln w="28575">
+            <a:solidFill>
+              <a:srgbClr val="FF0000"/>
+            </a:solidFill>
+          </a:ln>
+        </p:spPr>
+        <p:style>
+          <a:lnRef idx="2">
+            <a:schemeClr val="accent1">
+              <a:shade val="50000"/>
+            </a:schemeClr>
+          </a:lnRef>
+          <a:fillRef idx="1">
+            <a:schemeClr val="accent1"/>
+          </a:fillRef>
+          <a:effectRef idx="0">
+            <a:schemeClr val="accent1"/>
+          </a:effectRef>
+          <a:fontRef idx="minor">
+            <a:schemeClr val="lt1"/>
+          </a:fontRef>
+        </p:style>
+        <p:txBody>
+          <a:bodyPr rtlCol="0" anchor="ctr"/>
+          <a:lstStyle/>
+          <a:p>
+            <a:pPr algn="ctr"/>
+            <a:endParaRPr lang="en-US" dirty="0"/>
+          </a:p>
+        </p:txBody>
+      </p:sp>
+      <p:pic>
+        <p:nvPicPr>
+          <p:cNvPr id="8" name="Graphic 7" descr="Line Arrow: Straight">
+            <a:extLst>
+              <a:ext uri="{FF2B5EF4-FFF2-40B4-BE49-F238E27FC236}">
+                <a16:creationId xmlns:a16="http://schemas.microsoft.com/office/drawing/2014/main" id="{DB054A37-A6C7-41A1-86A0-FEB4AB27482D}"/>
+              </a:ext>
+            </a:extLst>
+          </p:cNvPr>
+          <p:cNvPicPr>
+            <a:picLocks noChangeAspect="1"/>
+          </p:cNvPicPr>
+          <p:nvPr/>
+        </p:nvPicPr>
+        <p:blipFill>
+          <a:blip r:embed="rId4">
+            <a:extLst>
+              <a:ext uri="{28A0092B-C50C-407E-A947-70E740481C1C}">
+                <a14:useLocalDpi xmlns:a14="http://schemas.microsoft.com/office/drawing/2010/main" val="0"/>
+              </a:ext>
+              <a:ext uri="{96DAC541-7B7A-43D3-8B79-37D633B846F1}">
+                <asvg:svgBlip xmlns:asvg="http://schemas.microsoft.com/office/drawing/2016/SVG/main" r:embed="rId5"/>
+              </a:ext>
+            </a:extLst>
+          </a:blip>
+          <a:stretch>
+            <a:fillRect/>
+          </a:stretch>
+        </p:blipFill>
+        <p:spPr>
+          <a:xfrm rot="10800000">
+            <a:off x="4310454" y="4765834"/>
+            <a:ext cx="620724" cy="620724"/>
+          </a:xfrm>
+          <a:prstGeom prst="rect">
+            <a:avLst/>
+          </a:prstGeom>
+        </p:spPr>
+      </p:pic>
+    </p:spTree>
+    <p:extLst>
+      <p:ext uri="{BB962C8B-B14F-4D97-AF65-F5344CB8AC3E}">
+        <p14:creationId xmlns:p14="http://schemas.microsoft.com/office/powerpoint/2010/main" val="2728985171"/>
       </p:ext>
     </p:extLst>
   </p:cSld>

</xml_diff>